<commit_message>
a number of modifications such as addition of method overview figures and many corrections of manuscript
</commit_message>
<xml_diff>
--- a/figure/methodOverview/methodOverview.pptx
+++ b/figure/methodOverview/methodOverview.pptx
@@ -3841,176 +3841,6 @@
       </p:sp>
       <p:sp>
         <p:nvSpPr>
-          <p:cNvPr id="43" name="テキスト ボックス 42"/>
-          <p:cNvSpPr txBox="1"/>
-          <p:nvPr/>
-        </p:nvSpPr>
-        <p:spPr>
-          <a:xfrm>
-            <a:off x="7453018" y="1610186"/>
-            <a:ext cx="1353856" cy="461665"/>
-          </a:xfrm>
-          <a:prstGeom prst="rect">
-            <a:avLst/>
-          </a:prstGeom>
-          <a:noFill/>
-        </p:spPr>
-        <p:txBody>
-          <a:bodyPr wrap="none" rtlCol="0">
-            <a:spAutoFit/>
-          </a:bodyPr>
-          <a:lstStyle/>
-          <a:p>
-            <a:r>
-              <a:rPr lang="en-US" altLang="ja-JP" sz="2400" b="1" dirty="0" smtClean="0">
-                <a:solidFill>
-                  <a:srgbClr val="996633"/>
-                </a:solidFill>
-                <a:latin typeface="Arial Black"/>
-                <a:ea typeface="ＤＦＰ勘亭流" charset="2"/>
-                <a:cs typeface="Arial Black"/>
-              </a:rPr>
-              <a:t>G</a:t>
-            </a:r>
-            <a:r>
-              <a:rPr lang="en-US" altLang="ja-JP" sz="2400" b="1" dirty="0" smtClean="0">
-                <a:solidFill>
-                  <a:srgbClr val="FF0000"/>
-                </a:solidFill>
-                <a:latin typeface="Arial Black"/>
-                <a:ea typeface="ＤＦＰ勘亭流" charset="2"/>
-                <a:cs typeface="Arial Black"/>
-              </a:rPr>
-              <a:t>T</a:t>
-            </a:r>
-            <a:r>
-              <a:rPr lang="en-US" altLang="ja-JP" sz="2400" b="1" dirty="0" smtClean="0">
-                <a:solidFill>
-                  <a:srgbClr val="0000FF"/>
-                </a:solidFill>
-                <a:latin typeface="Arial Black"/>
-                <a:ea typeface="ＤＦＰ勘亭流" charset="2"/>
-                <a:cs typeface="Arial Black"/>
-              </a:rPr>
-              <a:t>CC</a:t>
-            </a:r>
-            <a:r>
-              <a:rPr lang="en-US" altLang="ja-JP" sz="2400" b="1" dirty="0" smtClean="0">
-                <a:solidFill>
-                  <a:srgbClr val="FF0000"/>
-                </a:solidFill>
-                <a:latin typeface="Arial Black"/>
-                <a:ea typeface="ＤＦＰ勘亭流" charset="2"/>
-                <a:cs typeface="Arial Black"/>
-              </a:rPr>
-              <a:t>T</a:t>
-            </a:r>
-            <a:endParaRPr kumimoji="1" lang="ja-JP" altLang="en-US" sz="2400" b="1" dirty="0">
-              <a:solidFill>
-                <a:srgbClr val="800000"/>
-              </a:solidFill>
-              <a:latin typeface="Arial Black"/>
-              <a:ea typeface="ＤＦＰ勘亭流" charset="2"/>
-              <a:cs typeface="Arial Black"/>
-            </a:endParaRPr>
-          </a:p>
-        </p:txBody>
-      </p:sp>
-      <p:sp>
-        <p:nvSpPr>
-          <p:cNvPr id="44" name="上矢印 43"/>
-          <p:cNvSpPr/>
-          <p:nvPr/>
-        </p:nvSpPr>
-        <p:spPr>
-          <a:xfrm>
-            <a:off x="8045732" y="1478427"/>
-            <a:ext cx="180000" cy="180000"/>
-          </a:xfrm>
-          <a:prstGeom prst="upArrow">
-            <a:avLst/>
-          </a:prstGeom>
-          <a:solidFill>
-            <a:schemeClr val="bg2">
-              <a:lumMod val="50000"/>
-            </a:schemeClr>
-          </a:solidFill>
-          <a:ln>
-            <a:solidFill>
-              <a:schemeClr val="bg2">
-                <a:lumMod val="10000"/>
-              </a:schemeClr>
-            </a:solidFill>
-          </a:ln>
-        </p:spPr>
-        <p:style>
-          <a:lnRef idx="1">
-            <a:schemeClr val="accent1"/>
-          </a:lnRef>
-          <a:fillRef idx="3">
-            <a:schemeClr val="accent1"/>
-          </a:fillRef>
-          <a:effectRef idx="2">
-            <a:schemeClr val="accent1"/>
-          </a:effectRef>
-          <a:fontRef idx="minor">
-            <a:schemeClr val="lt1"/>
-          </a:fontRef>
-        </p:style>
-        <p:txBody>
-          <a:bodyPr rtlCol="0" anchor="ctr"/>
-          <a:lstStyle/>
-          <a:p>
-            <a:pPr algn="ctr"/>
-            <a:endParaRPr kumimoji="1" lang="ja-JP" altLang="en-US" sz="2400" dirty="0"/>
-          </a:p>
-        </p:txBody>
-      </p:sp>
-      <p:sp>
-        <p:nvSpPr>
-          <p:cNvPr id="45" name="正方形/長方形 44"/>
-          <p:cNvSpPr/>
-          <p:nvPr/>
-        </p:nvSpPr>
-        <p:spPr>
-          <a:xfrm>
-            <a:off x="7932266" y="1057293"/>
-            <a:ext cx="406932" cy="461665"/>
-          </a:xfrm>
-          <a:prstGeom prst="rect">
-            <a:avLst/>
-          </a:prstGeom>
-        </p:spPr>
-        <p:txBody>
-          <a:bodyPr wrap="none">
-            <a:spAutoFit/>
-          </a:bodyPr>
-          <a:lstStyle/>
-          <a:p>
-            <a:r>
-              <a:rPr lang="en-US" altLang="ja-JP" sz="2400" b="1" dirty="0" smtClean="0">
-                <a:solidFill>
-                  <a:srgbClr val="FF0000"/>
-                </a:solidFill>
-                <a:latin typeface="Arial Black"/>
-                <a:ea typeface="ＤＦＰ勘亭流" charset="2"/>
-                <a:cs typeface="Arial Black"/>
-              </a:rPr>
-              <a:t>T</a:t>
-            </a:r>
-            <a:endParaRPr lang="ja-JP" altLang="en-US" sz="2400" b="1" dirty="0">
-              <a:solidFill>
-                <a:srgbClr val="800000"/>
-              </a:solidFill>
-              <a:latin typeface="Arial Black"/>
-              <a:ea typeface="ＤＦＰ勘亭流" charset="2"/>
-              <a:cs typeface="Arial Black"/>
-            </a:endParaRPr>
-          </a:p>
-        </p:txBody>
-      </p:sp>
-      <p:sp>
-        <p:nvSpPr>
           <p:cNvPr id="46" name="テキスト ボックス 45"/>
           <p:cNvSpPr txBox="1"/>
           <p:nvPr/>
@@ -4437,706 +4267,936 @@
           </a:p>
         </p:txBody>
       </p:sp>
-      <p:sp>
-        <p:nvSpPr>
-          <p:cNvPr id="80" name="テキスト ボックス 79"/>
-          <p:cNvSpPr txBox="1"/>
+      <p:grpSp>
+        <p:nvGrpSpPr>
+          <p:cNvPr id="103" name="図形グループ 102"/>
+          <p:cNvGrpSpPr/>
           <p:nvPr/>
-        </p:nvSpPr>
-        <p:spPr>
+        </p:nvGrpSpPr>
+        <p:grpSpPr>
           <a:xfrm>
-            <a:off x="8453622" y="1057293"/>
-            <a:ext cx="287158" cy="461665"/>
+            <a:off x="7503663" y="1057293"/>
+            <a:ext cx="1353856" cy="1014558"/>
+            <a:chOff x="7453018" y="1057293"/>
+            <a:chExt cx="1353856" cy="1014558"/>
           </a:xfrm>
-          <a:prstGeom prst="rect">
-            <a:avLst/>
-          </a:prstGeom>
-          <a:noFill/>
-        </p:spPr>
-        <p:txBody>
-          <a:bodyPr wrap="none" rtlCol="0">
-            <a:spAutoFit/>
-          </a:bodyPr>
-          <a:lstStyle/>
-          <a:p>
-            <a:r>
-              <a:rPr lang="en-US" altLang="ja-JP" sz="2400" dirty="0" smtClean="0">
+        </p:grpSpPr>
+        <p:sp>
+          <p:nvSpPr>
+            <p:cNvPr id="43" name="テキスト ボックス 42"/>
+            <p:cNvSpPr txBox="1"/>
+            <p:nvPr/>
+          </p:nvSpPr>
+          <p:spPr>
+            <a:xfrm>
+              <a:off x="7453018" y="1610186"/>
+              <a:ext cx="1353856" cy="461665"/>
+            </a:xfrm>
+            <a:prstGeom prst="rect">
+              <a:avLst/>
+            </a:prstGeom>
+            <a:noFill/>
+          </p:spPr>
+          <p:txBody>
+            <a:bodyPr wrap="none" rtlCol="0">
+              <a:spAutoFit/>
+            </a:bodyPr>
+            <a:lstStyle/>
+            <a:p>
+              <a:r>
+                <a:rPr lang="en-US" altLang="ja-JP" sz="2400" b="1" dirty="0" smtClean="0">
+                  <a:solidFill>
+                    <a:srgbClr val="996633"/>
+                  </a:solidFill>
+                  <a:latin typeface="Arial Black"/>
+                  <a:ea typeface="ＤＦＰ勘亭流" charset="2"/>
+                  <a:cs typeface="Arial Black"/>
+                </a:rPr>
+                <a:t>G</a:t>
+              </a:r>
+              <a:r>
+                <a:rPr lang="en-US" altLang="ja-JP" sz="2400" b="1" dirty="0" smtClean="0">
+                  <a:solidFill>
+                    <a:srgbClr val="FF0000"/>
+                  </a:solidFill>
+                  <a:latin typeface="Arial Black"/>
+                  <a:ea typeface="ＤＦＰ勘亭流" charset="2"/>
+                  <a:cs typeface="Arial Black"/>
+                </a:rPr>
+                <a:t>T</a:t>
+              </a:r>
+              <a:r>
+                <a:rPr lang="en-US" altLang="ja-JP" sz="2400" b="1" dirty="0" smtClean="0">
+                  <a:solidFill>
+                    <a:srgbClr val="0000FF"/>
+                  </a:solidFill>
+                  <a:latin typeface="Arial Black"/>
+                  <a:ea typeface="ＤＦＰ勘亭流" charset="2"/>
+                  <a:cs typeface="Arial Black"/>
+                </a:rPr>
+                <a:t>CC</a:t>
+              </a:r>
+              <a:r>
+                <a:rPr lang="en-US" altLang="ja-JP" sz="2400" b="1" dirty="0" smtClean="0">
+                  <a:solidFill>
+                    <a:srgbClr val="FF0000"/>
+                  </a:solidFill>
+                  <a:latin typeface="Arial Black"/>
+                  <a:ea typeface="ＤＦＰ勘亭流" charset="2"/>
+                  <a:cs typeface="Arial Black"/>
+                </a:rPr>
+                <a:t>T</a:t>
+              </a:r>
+              <a:endParaRPr kumimoji="1" lang="ja-JP" altLang="en-US" sz="2400" b="1" dirty="0">
+                <a:solidFill>
+                  <a:srgbClr val="800000"/>
+                </a:solidFill>
+                <a:latin typeface="Arial Black"/>
+                <a:ea typeface="ＤＦＰ勘亭流" charset="2"/>
+                <a:cs typeface="Arial Black"/>
+              </a:endParaRPr>
+            </a:p>
+          </p:txBody>
+        </p:sp>
+        <p:sp>
+          <p:nvSpPr>
+            <p:cNvPr id="44" name="上矢印 43"/>
+            <p:cNvSpPr/>
+            <p:nvPr/>
+          </p:nvSpPr>
+          <p:spPr>
+            <a:xfrm>
+              <a:off x="8045732" y="1478427"/>
+              <a:ext cx="180000" cy="180000"/>
+            </a:xfrm>
+            <a:prstGeom prst="upArrow">
+              <a:avLst/>
+            </a:prstGeom>
+            <a:solidFill>
+              <a:schemeClr val="bg2">
+                <a:lumMod val="50000"/>
+              </a:schemeClr>
+            </a:solidFill>
+            <a:ln>
+              <a:solidFill>
+                <a:schemeClr val="bg2">
+                  <a:lumMod val="10000"/>
+                </a:schemeClr>
+              </a:solidFill>
+            </a:ln>
+          </p:spPr>
+          <p:style>
+            <a:lnRef idx="1">
+              <a:schemeClr val="accent1"/>
+            </a:lnRef>
+            <a:fillRef idx="3">
+              <a:schemeClr val="accent1"/>
+            </a:fillRef>
+            <a:effectRef idx="2">
+              <a:schemeClr val="accent1"/>
+            </a:effectRef>
+            <a:fontRef idx="minor">
+              <a:schemeClr val="lt1"/>
+            </a:fontRef>
+          </p:style>
+          <p:txBody>
+            <a:bodyPr rtlCol="0" anchor="ctr"/>
+            <a:lstStyle/>
+            <a:p>
+              <a:pPr algn="ctr"/>
+              <a:endParaRPr kumimoji="1" lang="ja-JP" altLang="en-US" sz="2400" dirty="0"/>
+            </a:p>
+          </p:txBody>
+        </p:sp>
+        <p:sp>
+          <p:nvSpPr>
+            <p:cNvPr id="45" name="正方形/長方形 44"/>
+            <p:cNvSpPr/>
+            <p:nvPr/>
+          </p:nvSpPr>
+          <p:spPr>
+            <a:xfrm>
+              <a:off x="7932266" y="1057293"/>
+              <a:ext cx="406932" cy="461665"/>
+            </a:xfrm>
+            <a:prstGeom prst="rect">
+              <a:avLst/>
+            </a:prstGeom>
+          </p:spPr>
+          <p:txBody>
+            <a:bodyPr wrap="none">
+              <a:spAutoFit/>
+            </a:bodyPr>
+            <a:lstStyle/>
+            <a:p>
+              <a:r>
+                <a:rPr lang="en-US" altLang="ja-JP" sz="2400" b="1" dirty="0" smtClean="0">
+                  <a:solidFill>
+                    <a:srgbClr val="FF0000"/>
+                  </a:solidFill>
+                  <a:latin typeface="Arial Black"/>
+                  <a:ea typeface="ＤＦＰ勘亭流" charset="2"/>
+                  <a:cs typeface="Arial Black"/>
+                </a:rPr>
+                <a:t>T</a:t>
+              </a:r>
+              <a:endParaRPr lang="ja-JP" altLang="en-US" sz="2400" b="1" dirty="0">
+                <a:solidFill>
+                  <a:srgbClr val="800000"/>
+                </a:solidFill>
+                <a:latin typeface="Arial Black"/>
+                <a:ea typeface="ＤＦＰ勘亭流" charset="2"/>
+                <a:cs typeface="Arial Black"/>
+              </a:endParaRPr>
+            </a:p>
+          </p:txBody>
+        </p:sp>
+        <p:sp>
+          <p:nvSpPr>
+            <p:cNvPr id="80" name="テキスト ボックス 79"/>
+            <p:cNvSpPr txBox="1"/>
+            <p:nvPr/>
+          </p:nvSpPr>
+          <p:spPr>
+            <a:xfrm>
+              <a:off x="8453622" y="1057293"/>
+              <a:ext cx="287158" cy="461665"/>
+            </a:xfrm>
+            <a:prstGeom prst="rect">
+              <a:avLst/>
+            </a:prstGeom>
+            <a:noFill/>
+          </p:spPr>
+          <p:txBody>
+            <a:bodyPr wrap="none" rtlCol="0">
+              <a:spAutoFit/>
+            </a:bodyPr>
+            <a:lstStyle/>
+            <a:p>
+              <a:r>
+                <a:rPr lang="en-US" altLang="ja-JP" sz="2400" dirty="0" smtClean="0">
+                  <a:solidFill>
+                    <a:srgbClr val="FF00FF"/>
+                  </a:solidFill>
+                  <a:latin typeface="Arial Black"/>
+                  <a:cs typeface="Arial Black"/>
+                </a:rPr>
+                <a:t>-</a:t>
+              </a:r>
+              <a:endParaRPr lang="ja-JP" altLang="en-US" sz="2400" dirty="0">
                 <a:solidFill>
                   <a:srgbClr val="FF00FF"/>
                 </a:solidFill>
                 <a:latin typeface="Arial Black"/>
                 <a:cs typeface="Arial Black"/>
-              </a:rPr>
-              <a:t>-</a:t>
-            </a:r>
-            <a:endParaRPr lang="ja-JP" altLang="en-US" sz="2400" dirty="0">
-              <a:solidFill>
-                <a:srgbClr val="FF00FF"/>
-              </a:solidFill>
-              <a:latin typeface="Arial Black"/>
-              <a:cs typeface="Arial Black"/>
-            </a:endParaRPr>
-          </a:p>
-        </p:txBody>
-      </p:sp>
-      <p:sp>
-        <p:nvSpPr>
-          <p:cNvPr id="81" name="テキスト ボックス 80"/>
-          <p:cNvSpPr txBox="1"/>
+              </a:endParaRPr>
+            </a:p>
+          </p:txBody>
+        </p:sp>
+      </p:grpSp>
+      <p:grpSp>
+        <p:nvGrpSpPr>
+          <p:cNvPr id="102" name="図形グループ 101"/>
+          <p:cNvGrpSpPr/>
           <p:nvPr/>
-        </p:nvSpPr>
-        <p:spPr>
+        </p:nvGrpSpPr>
+        <p:grpSpPr>
           <a:xfrm>
-            <a:off x="7453018" y="2822897"/>
-            <a:ext cx="1315685" cy="461665"/>
+            <a:off x="7516596" y="2270004"/>
+            <a:ext cx="1315685" cy="1014558"/>
+            <a:chOff x="7453018" y="2270004"/>
+            <a:chExt cx="1315685" cy="1014558"/>
           </a:xfrm>
-          <a:prstGeom prst="rect">
-            <a:avLst/>
-          </a:prstGeom>
-          <a:noFill/>
-        </p:spPr>
-        <p:txBody>
-          <a:bodyPr wrap="none" rtlCol="0">
-            <a:spAutoFit/>
-          </a:bodyPr>
-          <a:lstStyle/>
-          <a:p>
-            <a:r>
-              <a:rPr lang="en-US" altLang="ja-JP" sz="2400" b="1" dirty="0" smtClean="0">
+        </p:grpSpPr>
+        <p:sp>
+          <p:nvSpPr>
+            <p:cNvPr id="81" name="テキスト ボックス 80"/>
+            <p:cNvSpPr txBox="1"/>
+            <p:nvPr/>
+          </p:nvSpPr>
+          <p:spPr>
+            <a:xfrm>
+              <a:off x="7453018" y="2822897"/>
+              <a:ext cx="1315685" cy="461665"/>
+            </a:xfrm>
+            <a:prstGeom prst="rect">
+              <a:avLst/>
+            </a:prstGeom>
+            <a:noFill/>
+          </p:spPr>
+          <p:txBody>
+            <a:bodyPr wrap="none" rtlCol="0">
+              <a:spAutoFit/>
+            </a:bodyPr>
+            <a:lstStyle/>
+            <a:p>
+              <a:r>
+                <a:rPr lang="en-US" altLang="ja-JP" sz="2400" b="1" dirty="0" smtClean="0">
+                  <a:solidFill>
+                    <a:srgbClr val="FF0000"/>
+                  </a:solidFill>
+                  <a:latin typeface="Arial Black"/>
+                  <a:ea typeface="ＤＦＰ勘亭流" charset="2"/>
+                  <a:cs typeface="Arial Black"/>
+                </a:rPr>
+                <a:t>T</a:t>
+              </a:r>
+              <a:r>
+                <a:rPr lang="en-US" altLang="ja-JP" sz="2400" b="1" dirty="0" smtClean="0">
+                  <a:solidFill>
+                    <a:srgbClr val="0000FF"/>
+                  </a:solidFill>
+                  <a:latin typeface="Arial Black"/>
+                  <a:ea typeface="ＤＦＰ勘亭流" charset="2"/>
+                  <a:cs typeface="Arial Black"/>
+                </a:rPr>
+                <a:t>CC</a:t>
+              </a:r>
+              <a:r>
+                <a:rPr lang="en-US" altLang="ja-JP" sz="2400" b="1" dirty="0" smtClean="0">
+                  <a:solidFill>
+                    <a:srgbClr val="00FF00"/>
+                  </a:solidFill>
+                  <a:latin typeface="Arial Black"/>
+                  <a:ea typeface="ＤＦＰ勘亭流" charset="2"/>
+                  <a:cs typeface="Arial Black"/>
+                </a:rPr>
+                <a:t>A</a:t>
+              </a:r>
+              <a:r>
+                <a:rPr lang="en-US" altLang="ja-JP" sz="2400" b="1" dirty="0" smtClean="0">
+                  <a:solidFill>
+                    <a:srgbClr val="FF0000"/>
+                  </a:solidFill>
+                  <a:latin typeface="Arial Black"/>
+                  <a:ea typeface="ＤＦＰ勘亭流" charset="2"/>
+                  <a:cs typeface="Arial Black"/>
+                </a:rPr>
+                <a:t>T</a:t>
+              </a:r>
+              <a:endParaRPr kumimoji="1" lang="ja-JP" altLang="en-US" sz="2400" b="1" dirty="0">
                 <a:solidFill>
-                  <a:srgbClr val="FF0000"/>
+                  <a:srgbClr val="800000"/>
                 </a:solidFill>
                 <a:latin typeface="Arial Black"/>
                 <a:ea typeface="ＤＦＰ勘亭流" charset="2"/>
                 <a:cs typeface="Arial Black"/>
-              </a:rPr>
-              <a:t>T</a:t>
-            </a:r>
-            <a:r>
-              <a:rPr lang="en-US" altLang="ja-JP" sz="2400" b="1" dirty="0" smtClean="0">
+              </a:endParaRPr>
+            </a:p>
+          </p:txBody>
+        </p:sp>
+        <p:sp>
+          <p:nvSpPr>
+            <p:cNvPr id="82" name="上矢印 81"/>
+            <p:cNvSpPr/>
+            <p:nvPr/>
+          </p:nvSpPr>
+          <p:spPr>
+            <a:xfrm>
+              <a:off x="8045732" y="2691138"/>
+              <a:ext cx="180000" cy="180000"/>
+            </a:xfrm>
+            <a:prstGeom prst="upArrow">
+              <a:avLst/>
+            </a:prstGeom>
+            <a:solidFill>
+              <a:schemeClr val="bg2">
+                <a:lumMod val="50000"/>
+              </a:schemeClr>
+            </a:solidFill>
+            <a:ln>
+              <a:solidFill>
+                <a:schemeClr val="bg2">
+                  <a:lumMod val="10000"/>
+                </a:schemeClr>
+              </a:solidFill>
+            </a:ln>
+          </p:spPr>
+          <p:style>
+            <a:lnRef idx="1">
+              <a:schemeClr val="accent1"/>
+            </a:lnRef>
+            <a:fillRef idx="3">
+              <a:schemeClr val="accent1"/>
+            </a:fillRef>
+            <a:effectRef idx="2">
+              <a:schemeClr val="accent1"/>
+            </a:effectRef>
+            <a:fontRef idx="minor">
+              <a:schemeClr val="lt1"/>
+            </a:fontRef>
+          </p:style>
+          <p:txBody>
+            <a:bodyPr rtlCol="0" anchor="ctr"/>
+            <a:lstStyle/>
+            <a:p>
+              <a:pPr algn="ctr"/>
+              <a:endParaRPr kumimoji="1" lang="ja-JP" altLang="en-US" sz="2400" dirty="0"/>
+            </a:p>
+          </p:txBody>
+        </p:sp>
+        <p:sp>
+          <p:nvSpPr>
+            <p:cNvPr id="83" name="正方形/長方形 82"/>
+            <p:cNvSpPr/>
+            <p:nvPr/>
+          </p:nvSpPr>
+          <p:spPr>
+            <a:xfrm>
+              <a:off x="7932266" y="2270004"/>
+              <a:ext cx="406932" cy="461665"/>
+            </a:xfrm>
+            <a:prstGeom prst="rect">
+              <a:avLst/>
+            </a:prstGeom>
+          </p:spPr>
+          <p:txBody>
+            <a:bodyPr wrap="none">
+              <a:spAutoFit/>
+            </a:bodyPr>
+            <a:lstStyle/>
+            <a:p>
+              <a:r>
+                <a:rPr lang="en-US" altLang="ja-JP" sz="2400" b="1" dirty="0" smtClean="0">
+                  <a:solidFill>
+                    <a:srgbClr val="FF0000"/>
+                  </a:solidFill>
+                  <a:latin typeface="Arial Black"/>
+                  <a:ea typeface="ＤＦＰ勘亭流" charset="2"/>
+                  <a:cs typeface="Arial Black"/>
+                </a:rPr>
+                <a:t>T</a:t>
+              </a:r>
+              <a:endParaRPr lang="ja-JP" altLang="en-US" sz="2400" b="1" dirty="0">
                 <a:solidFill>
-                  <a:srgbClr val="0000FF"/>
+                  <a:srgbClr val="800000"/>
                 </a:solidFill>
                 <a:latin typeface="Arial Black"/>
                 <a:ea typeface="ＤＦＰ勘亭流" charset="2"/>
                 <a:cs typeface="Arial Black"/>
-              </a:rPr>
-              <a:t>CC</a:t>
-            </a:r>
-            <a:r>
-              <a:rPr lang="en-US" altLang="ja-JP" sz="2400" b="1" dirty="0" smtClean="0">
-                <a:solidFill>
-                  <a:srgbClr val="00FF00"/>
-                </a:solidFill>
-                <a:latin typeface="Arial Black"/>
-                <a:ea typeface="ＤＦＰ勘亭流" charset="2"/>
-                <a:cs typeface="Arial Black"/>
-              </a:rPr>
-              <a:t>A</a:t>
-            </a:r>
-            <a:r>
-              <a:rPr lang="en-US" altLang="ja-JP" sz="2400" b="1" dirty="0" smtClean="0">
-                <a:solidFill>
-                  <a:srgbClr val="FF0000"/>
-                </a:solidFill>
-                <a:latin typeface="Arial Black"/>
-                <a:ea typeface="ＤＦＰ勘亭流" charset="2"/>
-                <a:cs typeface="Arial Black"/>
-              </a:rPr>
-              <a:t>T</a:t>
-            </a:r>
-            <a:endParaRPr kumimoji="1" lang="ja-JP" altLang="en-US" sz="2400" b="1" dirty="0">
-              <a:solidFill>
-                <a:srgbClr val="800000"/>
-              </a:solidFill>
-              <a:latin typeface="Arial Black"/>
-              <a:ea typeface="ＤＦＰ勘亭流" charset="2"/>
-              <a:cs typeface="Arial Black"/>
-            </a:endParaRPr>
-          </a:p>
-        </p:txBody>
-      </p:sp>
-      <p:sp>
-        <p:nvSpPr>
-          <p:cNvPr id="82" name="上矢印 81"/>
-          <p:cNvSpPr/>
-          <p:nvPr/>
-        </p:nvSpPr>
-        <p:spPr>
-          <a:xfrm>
-            <a:off x="8045732" y="2691138"/>
-            <a:ext cx="180000" cy="180000"/>
-          </a:xfrm>
-          <a:prstGeom prst="upArrow">
-            <a:avLst/>
-          </a:prstGeom>
-          <a:solidFill>
-            <a:schemeClr val="bg2">
-              <a:lumMod val="50000"/>
-            </a:schemeClr>
-          </a:solidFill>
-          <a:ln>
-            <a:solidFill>
-              <a:schemeClr val="bg2">
-                <a:lumMod val="10000"/>
-              </a:schemeClr>
-            </a:solidFill>
-          </a:ln>
-        </p:spPr>
-        <p:style>
-          <a:lnRef idx="1">
-            <a:schemeClr val="accent1"/>
-          </a:lnRef>
-          <a:fillRef idx="3">
-            <a:schemeClr val="accent1"/>
-          </a:fillRef>
-          <a:effectRef idx="2">
-            <a:schemeClr val="accent1"/>
-          </a:effectRef>
-          <a:fontRef idx="minor">
-            <a:schemeClr val="lt1"/>
-          </a:fontRef>
-        </p:style>
-        <p:txBody>
-          <a:bodyPr rtlCol="0" anchor="ctr"/>
-          <a:lstStyle/>
-          <a:p>
-            <a:pPr algn="ctr"/>
-            <a:endParaRPr kumimoji="1" lang="ja-JP" altLang="en-US" sz="2400" dirty="0"/>
-          </a:p>
-        </p:txBody>
-      </p:sp>
-      <p:sp>
-        <p:nvSpPr>
-          <p:cNvPr id="83" name="正方形/長方形 82"/>
-          <p:cNvSpPr/>
-          <p:nvPr/>
-        </p:nvSpPr>
-        <p:spPr>
-          <a:xfrm>
-            <a:off x="7932266" y="2270004"/>
-            <a:ext cx="406932" cy="461665"/>
-          </a:xfrm>
-          <a:prstGeom prst="rect">
-            <a:avLst/>
-          </a:prstGeom>
-        </p:spPr>
-        <p:txBody>
-          <a:bodyPr wrap="none">
-            <a:spAutoFit/>
-          </a:bodyPr>
-          <a:lstStyle/>
-          <a:p>
-            <a:r>
-              <a:rPr lang="en-US" altLang="ja-JP" sz="2400" b="1" dirty="0" smtClean="0">
-                <a:solidFill>
-                  <a:srgbClr val="FF0000"/>
-                </a:solidFill>
-                <a:latin typeface="Arial Black"/>
-                <a:ea typeface="ＤＦＰ勘亭流" charset="2"/>
-                <a:cs typeface="Arial Black"/>
-              </a:rPr>
-              <a:t>T</a:t>
-            </a:r>
-            <a:endParaRPr lang="ja-JP" altLang="en-US" sz="2400" b="1" dirty="0">
-              <a:solidFill>
-                <a:srgbClr val="800000"/>
-              </a:solidFill>
-              <a:latin typeface="Arial Black"/>
-              <a:ea typeface="ＤＦＰ勘亭流" charset="2"/>
-              <a:cs typeface="Arial Black"/>
-            </a:endParaRPr>
-          </a:p>
-        </p:txBody>
-      </p:sp>
-      <p:sp>
-        <p:nvSpPr>
-          <p:cNvPr id="84" name="テキスト ボックス 83"/>
-          <p:cNvSpPr txBox="1"/>
-          <p:nvPr/>
-        </p:nvSpPr>
-        <p:spPr>
-          <a:xfrm>
-            <a:off x="8406094" y="2270004"/>
-            <a:ext cx="387847" cy="461665"/>
-          </a:xfrm>
-          <a:prstGeom prst="rect">
-            <a:avLst/>
-          </a:prstGeom>
-          <a:noFill/>
-        </p:spPr>
-        <p:txBody>
-          <a:bodyPr wrap="none" rtlCol="0">
-            <a:spAutoFit/>
-          </a:bodyPr>
-          <a:lstStyle/>
-          <a:p>
-            <a:r>
-              <a:rPr lang="en-US" altLang="ja-JP" sz="2400" dirty="0" smtClean="0">
+              </a:endParaRPr>
+            </a:p>
+          </p:txBody>
+        </p:sp>
+        <p:sp>
+          <p:nvSpPr>
+            <p:cNvPr id="84" name="テキスト ボックス 83"/>
+            <p:cNvSpPr txBox="1"/>
+            <p:nvPr/>
+          </p:nvSpPr>
+          <p:spPr>
+            <a:xfrm>
+              <a:off x="8352046" y="2270004"/>
+              <a:ext cx="387847" cy="461665"/>
+            </a:xfrm>
+            <a:prstGeom prst="rect">
+              <a:avLst/>
+            </a:prstGeom>
+            <a:noFill/>
+          </p:spPr>
+          <p:txBody>
+            <a:bodyPr wrap="none" rtlCol="0">
+              <a:spAutoFit/>
+            </a:bodyPr>
+            <a:lstStyle/>
+            <a:p>
+              <a:r>
+                <a:rPr lang="en-US" altLang="ja-JP" sz="2400" dirty="0" smtClean="0">
+                  <a:solidFill>
+                    <a:srgbClr val="00FFFF"/>
+                  </a:solidFill>
+                  <a:latin typeface="Arial Black"/>
+                  <a:cs typeface="Arial Black"/>
+                </a:rPr>
+                <a:t>+</a:t>
+              </a:r>
+              <a:endParaRPr lang="ja-JP" altLang="en-US" sz="2400" dirty="0">
                 <a:solidFill>
                   <a:srgbClr val="00FFFF"/>
                 </a:solidFill>
                 <a:latin typeface="Arial Black"/>
                 <a:cs typeface="Arial Black"/>
-              </a:rPr>
-              <a:t>+</a:t>
-            </a:r>
-            <a:endParaRPr lang="ja-JP" altLang="en-US" sz="2400" dirty="0">
-              <a:solidFill>
-                <a:srgbClr val="00FFFF"/>
-              </a:solidFill>
-              <a:latin typeface="Arial Black"/>
-              <a:cs typeface="Arial Black"/>
-            </a:endParaRPr>
-          </a:p>
-        </p:txBody>
-      </p:sp>
-      <p:sp>
-        <p:nvSpPr>
-          <p:cNvPr id="85" name="テキスト ボックス 84"/>
-          <p:cNvSpPr txBox="1"/>
+              </a:endParaRPr>
+            </a:p>
+          </p:txBody>
+        </p:sp>
+      </p:grpSp>
+      <p:grpSp>
+        <p:nvGrpSpPr>
+          <p:cNvPr id="101" name="図形グループ 100"/>
+          <p:cNvGrpSpPr/>
           <p:nvPr/>
-        </p:nvSpPr>
-        <p:spPr>
+        </p:nvGrpSpPr>
+        <p:grpSpPr>
           <a:xfrm>
-            <a:off x="7453018" y="3905139"/>
-            <a:ext cx="1404501" cy="461665"/>
+            <a:off x="7453018" y="3352246"/>
+            <a:ext cx="1404501" cy="1014558"/>
+            <a:chOff x="7453018" y="3352246"/>
+            <a:chExt cx="1404501" cy="1014558"/>
           </a:xfrm>
-          <a:prstGeom prst="rect">
-            <a:avLst/>
-          </a:prstGeom>
-          <a:noFill/>
-        </p:spPr>
-        <p:txBody>
-          <a:bodyPr wrap="none" rtlCol="0">
-            <a:spAutoFit/>
-          </a:bodyPr>
-          <a:lstStyle/>
-          <a:p>
-            <a:r>
-              <a:rPr lang="en-US" altLang="ja-JP" sz="2400" b="1" dirty="0" smtClean="0">
+        </p:grpSpPr>
+        <p:sp>
+          <p:nvSpPr>
+            <p:cNvPr id="85" name="テキスト ボックス 84"/>
+            <p:cNvSpPr txBox="1"/>
+            <p:nvPr/>
+          </p:nvSpPr>
+          <p:spPr>
+            <a:xfrm>
+              <a:off x="7453018" y="3905139"/>
+              <a:ext cx="1404501" cy="461665"/>
+            </a:xfrm>
+            <a:prstGeom prst="rect">
+              <a:avLst/>
+            </a:prstGeom>
+            <a:noFill/>
+          </p:spPr>
+          <p:txBody>
+            <a:bodyPr wrap="none" rtlCol="0">
+              <a:spAutoFit/>
+            </a:bodyPr>
+            <a:lstStyle/>
+            <a:p>
+              <a:r>
+                <a:rPr lang="en-US" altLang="ja-JP" sz="2400" b="1" dirty="0" smtClean="0">
+                  <a:solidFill>
+                    <a:srgbClr val="996633"/>
+                  </a:solidFill>
+                  <a:latin typeface="Arial Black"/>
+                  <a:ea typeface="ＤＦＰ勘亭流" charset="2"/>
+                  <a:cs typeface="Arial Black"/>
+                </a:rPr>
+                <a:t>G</a:t>
+              </a:r>
+              <a:r>
+                <a:rPr lang="en-US" altLang="ja-JP" sz="2400" b="1" dirty="0" smtClean="0">
+                  <a:solidFill>
+                    <a:srgbClr val="00FF00"/>
+                  </a:solidFill>
+                  <a:latin typeface="Arial Black"/>
+                  <a:ea typeface="ＤＦＰ勘亭流" charset="2"/>
+                  <a:cs typeface="Arial Black"/>
+                </a:rPr>
+                <a:t>A</a:t>
+              </a:r>
+              <a:r>
+                <a:rPr lang="en-US" altLang="ja-JP" sz="2400" b="1" dirty="0" smtClean="0">
+                  <a:solidFill>
+                    <a:srgbClr val="0000FF"/>
+                  </a:solidFill>
+                  <a:latin typeface="Arial Black"/>
+                  <a:ea typeface="ＤＦＰ勘亭流" charset="2"/>
+                  <a:cs typeface="Arial Black"/>
+                </a:rPr>
+                <a:t>C</a:t>
+              </a:r>
+              <a:r>
+                <a:rPr lang="en-US" altLang="ja-JP" sz="2400" b="1" dirty="0" smtClean="0">
+                  <a:solidFill>
+                    <a:srgbClr val="00FF00"/>
+                  </a:solidFill>
+                  <a:latin typeface="Arial Black"/>
+                  <a:ea typeface="ＤＦＰ勘亭流" charset="2"/>
+                  <a:cs typeface="Arial Black"/>
+                </a:rPr>
+                <a:t>A</a:t>
+              </a:r>
+              <a:r>
+                <a:rPr lang="en-US" altLang="ja-JP" sz="2400" b="1" dirty="0" smtClean="0">
+                  <a:solidFill>
+                    <a:srgbClr val="996633"/>
+                  </a:solidFill>
+                  <a:latin typeface="Arial Black"/>
+                  <a:ea typeface="ＤＦＰ勘亭流" charset="2"/>
+                  <a:cs typeface="Arial Black"/>
+                </a:rPr>
+                <a:t>G</a:t>
+              </a:r>
+              <a:endParaRPr lang="ja-JP" altLang="en-US" sz="2400" b="1" dirty="0">
                 <a:solidFill>
                   <a:srgbClr val="996633"/>
                 </a:solidFill>
                 <a:latin typeface="Arial Black"/>
                 <a:ea typeface="ＤＦＰ勘亭流" charset="2"/>
                 <a:cs typeface="Arial Black"/>
-              </a:rPr>
-              <a:t>G</a:t>
-            </a:r>
-            <a:r>
-              <a:rPr lang="en-US" altLang="ja-JP" sz="2400" b="1" dirty="0" smtClean="0">
+              </a:endParaRPr>
+            </a:p>
+          </p:txBody>
+        </p:sp>
+        <p:sp>
+          <p:nvSpPr>
+            <p:cNvPr id="86" name="上矢印 85"/>
+            <p:cNvSpPr/>
+            <p:nvPr/>
+          </p:nvSpPr>
+          <p:spPr>
+            <a:xfrm>
+              <a:off x="8045732" y="3773380"/>
+              <a:ext cx="180000" cy="180000"/>
+            </a:xfrm>
+            <a:prstGeom prst="upArrow">
+              <a:avLst/>
+            </a:prstGeom>
+            <a:solidFill>
+              <a:schemeClr val="bg2">
+                <a:lumMod val="50000"/>
+              </a:schemeClr>
+            </a:solidFill>
+            <a:ln>
+              <a:solidFill>
+                <a:schemeClr val="bg2">
+                  <a:lumMod val="10000"/>
+                </a:schemeClr>
+              </a:solidFill>
+            </a:ln>
+          </p:spPr>
+          <p:style>
+            <a:lnRef idx="1">
+              <a:schemeClr val="accent1"/>
+            </a:lnRef>
+            <a:fillRef idx="3">
+              <a:schemeClr val="accent1"/>
+            </a:fillRef>
+            <a:effectRef idx="2">
+              <a:schemeClr val="accent1"/>
+            </a:effectRef>
+            <a:fontRef idx="minor">
+              <a:schemeClr val="lt1"/>
+            </a:fontRef>
+          </p:style>
+          <p:txBody>
+            <a:bodyPr rtlCol="0" anchor="ctr"/>
+            <a:lstStyle/>
+            <a:p>
+              <a:pPr algn="ctr"/>
+              <a:endParaRPr kumimoji="1" lang="ja-JP" altLang="en-US" sz="2400" dirty="0"/>
+            </a:p>
+          </p:txBody>
+        </p:sp>
+        <p:sp>
+          <p:nvSpPr>
+            <p:cNvPr id="87" name="正方形/長方形 86"/>
+            <p:cNvSpPr/>
+            <p:nvPr/>
+          </p:nvSpPr>
+          <p:spPr>
+            <a:xfrm>
+              <a:off x="7932266" y="3352246"/>
+              <a:ext cx="441146" cy="461665"/>
+            </a:xfrm>
+            <a:prstGeom prst="rect">
+              <a:avLst/>
+            </a:prstGeom>
+          </p:spPr>
+          <p:txBody>
+            <a:bodyPr wrap="none">
+              <a:spAutoFit/>
+            </a:bodyPr>
+            <a:lstStyle/>
+            <a:p>
+              <a:r>
+                <a:rPr lang="en-US" altLang="ja-JP" sz="2400" b="1" dirty="0" smtClean="0">
+                  <a:solidFill>
+                    <a:srgbClr val="00FF00"/>
+                  </a:solidFill>
+                  <a:latin typeface="Arial Black"/>
+                  <a:ea typeface="ＤＦＰ勘亭流" charset="2"/>
+                  <a:cs typeface="Arial Black"/>
+                </a:rPr>
+                <a:t>A</a:t>
+              </a:r>
+              <a:endParaRPr lang="ja-JP" altLang="en-US" sz="2400" b="1" dirty="0">
                 <a:solidFill>
-                  <a:srgbClr val="00FF00"/>
+                  <a:srgbClr val="800000"/>
                 </a:solidFill>
                 <a:latin typeface="Arial Black"/>
                 <a:ea typeface="ＤＦＰ勘亭流" charset="2"/>
                 <a:cs typeface="Arial Black"/>
-              </a:rPr>
-              <a:t>A</a:t>
-            </a:r>
-            <a:r>
-              <a:rPr lang="en-US" altLang="ja-JP" sz="2400" b="1" dirty="0" smtClean="0">
+              </a:endParaRPr>
+            </a:p>
+          </p:txBody>
+        </p:sp>
+        <p:sp>
+          <p:nvSpPr>
+            <p:cNvPr id="88" name="テキスト ボックス 87"/>
+            <p:cNvSpPr txBox="1"/>
+            <p:nvPr/>
+          </p:nvSpPr>
+          <p:spPr>
+            <a:xfrm>
+              <a:off x="8453622" y="3367838"/>
+              <a:ext cx="287158" cy="461665"/>
+            </a:xfrm>
+            <a:prstGeom prst="rect">
+              <a:avLst/>
+            </a:prstGeom>
+            <a:noFill/>
+          </p:spPr>
+          <p:txBody>
+            <a:bodyPr wrap="none" rtlCol="0">
+              <a:spAutoFit/>
+            </a:bodyPr>
+            <a:lstStyle/>
+            <a:p>
+              <a:r>
+                <a:rPr lang="en-US" altLang="ja-JP" sz="2400" dirty="0" smtClean="0">
+                  <a:solidFill>
+                    <a:srgbClr val="FF00FF"/>
+                  </a:solidFill>
+                  <a:latin typeface="Arial Black"/>
+                  <a:cs typeface="Arial Black"/>
+                </a:rPr>
+                <a:t>-</a:t>
+              </a:r>
+              <a:endParaRPr lang="ja-JP" altLang="en-US" sz="2400" dirty="0">
                 <a:solidFill>
-                  <a:srgbClr val="0000FF"/>
+                  <a:srgbClr val="FF00FF"/>
                 </a:solidFill>
                 <a:latin typeface="Arial Black"/>
-                <a:ea typeface="ＤＦＰ勘亭流" charset="2"/>
                 <a:cs typeface="Arial Black"/>
-              </a:rPr>
-              <a:t>C</a:t>
-            </a:r>
-            <a:r>
-              <a:rPr lang="en-US" altLang="ja-JP" sz="2400" b="1" dirty="0" smtClean="0">
-                <a:solidFill>
-                  <a:srgbClr val="00FF00"/>
-                </a:solidFill>
-                <a:latin typeface="Arial Black"/>
-                <a:ea typeface="ＤＦＰ勘亭流" charset="2"/>
-                <a:cs typeface="Arial Black"/>
-              </a:rPr>
-              <a:t>A</a:t>
-            </a:r>
-            <a:r>
-              <a:rPr lang="en-US" altLang="ja-JP" sz="2400" b="1" dirty="0" smtClean="0">
+              </a:endParaRPr>
+            </a:p>
+          </p:txBody>
+        </p:sp>
+      </p:grpSp>
+      <p:grpSp>
+        <p:nvGrpSpPr>
+          <p:cNvPr id="100" name="図形グループ 99"/>
+          <p:cNvGrpSpPr/>
+          <p:nvPr/>
+        </p:nvGrpSpPr>
+        <p:grpSpPr>
+          <a:xfrm>
+            <a:off x="7492091" y="5707806"/>
+            <a:ext cx="1365428" cy="1014558"/>
+            <a:chOff x="7363018" y="5707806"/>
+            <a:chExt cx="1365428" cy="1014558"/>
+          </a:xfrm>
+        </p:grpSpPr>
+        <p:sp>
+          <p:nvSpPr>
+            <p:cNvPr id="93" name="テキスト ボックス 92"/>
+            <p:cNvSpPr txBox="1"/>
+            <p:nvPr/>
+          </p:nvSpPr>
+          <p:spPr>
+            <a:xfrm>
+              <a:off x="7363018" y="6260699"/>
+              <a:ext cx="1365428" cy="461665"/>
+            </a:xfrm>
+            <a:prstGeom prst="rect">
+              <a:avLst/>
+            </a:prstGeom>
+            <a:noFill/>
+          </p:spPr>
+          <p:txBody>
+            <a:bodyPr wrap="none" rtlCol="0">
+              <a:spAutoFit/>
+            </a:bodyPr>
+            <a:lstStyle/>
+            <a:p>
+              <a:r>
+                <a:rPr lang="en-US" altLang="ja-JP" sz="2400" b="1" dirty="0" smtClean="0">
+                  <a:solidFill>
+                    <a:srgbClr val="0000FF"/>
+                  </a:solidFill>
+                  <a:latin typeface="Arial Black"/>
+                  <a:ea typeface="ＤＦＰ勘亭流" charset="2"/>
+                  <a:cs typeface="Arial Black"/>
+                </a:rPr>
+                <a:t>C</a:t>
+              </a:r>
+              <a:r>
+                <a:rPr lang="en-US" altLang="ja-JP" sz="2400" b="1" dirty="0" smtClean="0">
+                  <a:solidFill>
+                    <a:srgbClr val="FF0000"/>
+                  </a:solidFill>
+                  <a:latin typeface="Arial Black"/>
+                  <a:ea typeface="ＤＦＰ勘亭流" charset="2"/>
+                  <a:cs typeface="Arial Black"/>
+                </a:rPr>
+                <a:t>T</a:t>
+              </a:r>
+              <a:r>
+                <a:rPr lang="en-US" altLang="ja-JP" sz="2400" b="1" dirty="0" smtClean="0">
+                  <a:solidFill>
+                    <a:srgbClr val="0000FF"/>
+                  </a:solidFill>
+                  <a:latin typeface="Arial Black"/>
+                  <a:ea typeface="ＤＦＰ勘亭流" charset="2"/>
+                  <a:cs typeface="Arial Black"/>
+                </a:rPr>
+                <a:t>C</a:t>
+              </a:r>
+              <a:r>
+                <a:rPr lang="en-US" altLang="ja-JP" sz="2400" b="1" dirty="0" smtClean="0">
+                  <a:solidFill>
+                    <a:srgbClr val="00FF00"/>
+                  </a:solidFill>
+                  <a:latin typeface="Arial Black"/>
+                  <a:ea typeface="ＤＦＰ勘亭流" charset="2"/>
+                  <a:cs typeface="Arial Black"/>
+                </a:rPr>
+                <a:t>A</a:t>
+              </a:r>
+              <a:r>
+                <a:rPr lang="en-US" altLang="ja-JP" sz="2400" b="1" dirty="0" smtClean="0">
+                  <a:solidFill>
+                    <a:srgbClr val="996633"/>
+                  </a:solidFill>
+                  <a:latin typeface="Arial Black"/>
+                  <a:ea typeface="ＤＦＰ勘亭流" charset="2"/>
+                  <a:cs typeface="Arial Black"/>
+                </a:rPr>
+                <a:t>G</a:t>
+              </a:r>
+              <a:endParaRPr kumimoji="1" lang="ja-JP" altLang="en-US" sz="2400" b="1" dirty="0">
                 <a:solidFill>
                   <a:srgbClr val="996633"/>
                 </a:solidFill>
                 <a:latin typeface="Arial Black"/>
                 <a:ea typeface="ＤＦＰ勘亭流" charset="2"/>
                 <a:cs typeface="Arial Black"/>
-              </a:rPr>
-              <a:t>G</a:t>
-            </a:r>
-            <a:endParaRPr lang="ja-JP" altLang="en-US" sz="2400" b="1" dirty="0">
-              <a:solidFill>
-                <a:srgbClr val="996633"/>
-              </a:solidFill>
-              <a:latin typeface="Arial Black"/>
-              <a:ea typeface="ＤＦＰ勘亭流" charset="2"/>
-              <a:cs typeface="Arial Black"/>
-            </a:endParaRPr>
-          </a:p>
-        </p:txBody>
-      </p:sp>
-      <p:sp>
-        <p:nvSpPr>
-          <p:cNvPr id="86" name="上矢印 85"/>
-          <p:cNvSpPr/>
-          <p:nvPr/>
-        </p:nvSpPr>
-        <p:spPr>
-          <a:xfrm>
-            <a:off x="8045732" y="3773380"/>
-            <a:ext cx="180000" cy="180000"/>
-          </a:xfrm>
-          <a:prstGeom prst="upArrow">
-            <a:avLst/>
-          </a:prstGeom>
-          <a:solidFill>
-            <a:schemeClr val="bg2">
-              <a:lumMod val="50000"/>
-            </a:schemeClr>
-          </a:solidFill>
-          <a:ln>
+              </a:endParaRPr>
+            </a:p>
+          </p:txBody>
+        </p:sp>
+        <p:sp>
+          <p:nvSpPr>
+            <p:cNvPr id="94" name="上矢印 93"/>
+            <p:cNvSpPr/>
+            <p:nvPr/>
+          </p:nvSpPr>
+          <p:spPr>
+            <a:xfrm>
+              <a:off x="7955732" y="6128940"/>
+              <a:ext cx="180000" cy="180000"/>
+            </a:xfrm>
+            <a:prstGeom prst="upArrow">
+              <a:avLst/>
+            </a:prstGeom>
             <a:solidFill>
               <a:schemeClr val="bg2">
-                <a:lumMod val="10000"/>
+                <a:lumMod val="50000"/>
               </a:schemeClr>
             </a:solidFill>
-          </a:ln>
-        </p:spPr>
-        <p:style>
-          <a:lnRef idx="1">
-            <a:schemeClr val="accent1"/>
-          </a:lnRef>
-          <a:fillRef idx="3">
-            <a:schemeClr val="accent1"/>
-          </a:fillRef>
-          <a:effectRef idx="2">
-            <a:schemeClr val="accent1"/>
-          </a:effectRef>
-          <a:fontRef idx="minor">
-            <a:schemeClr val="lt1"/>
-          </a:fontRef>
-        </p:style>
-        <p:txBody>
-          <a:bodyPr rtlCol="0" anchor="ctr"/>
-          <a:lstStyle/>
-          <a:p>
-            <a:pPr algn="ctr"/>
-            <a:endParaRPr kumimoji="1" lang="ja-JP" altLang="en-US" sz="2400" dirty="0"/>
-          </a:p>
-        </p:txBody>
-      </p:sp>
-      <p:sp>
-        <p:nvSpPr>
-          <p:cNvPr id="87" name="正方形/長方形 86"/>
-          <p:cNvSpPr/>
-          <p:nvPr/>
-        </p:nvSpPr>
-        <p:spPr>
-          <a:xfrm>
-            <a:off x="7932266" y="3352246"/>
-            <a:ext cx="441146" cy="461665"/>
-          </a:xfrm>
-          <a:prstGeom prst="rect">
-            <a:avLst/>
-          </a:prstGeom>
-        </p:spPr>
-        <p:txBody>
-          <a:bodyPr wrap="none">
-            <a:spAutoFit/>
-          </a:bodyPr>
-          <a:lstStyle/>
-          <a:p>
-            <a:r>
-              <a:rPr lang="en-US" altLang="ja-JP" sz="2400" b="1" dirty="0" smtClean="0">
+            <a:ln>
+              <a:solidFill>
+                <a:schemeClr val="bg2">
+                  <a:lumMod val="10000"/>
+                </a:schemeClr>
+              </a:solidFill>
+            </a:ln>
+          </p:spPr>
+          <p:style>
+            <a:lnRef idx="1">
+              <a:schemeClr val="accent1"/>
+            </a:lnRef>
+            <a:fillRef idx="3">
+              <a:schemeClr val="accent1"/>
+            </a:fillRef>
+            <a:effectRef idx="2">
+              <a:schemeClr val="accent1"/>
+            </a:effectRef>
+            <a:fontRef idx="minor">
+              <a:schemeClr val="lt1"/>
+            </a:fontRef>
+          </p:style>
+          <p:txBody>
+            <a:bodyPr rtlCol="0" anchor="ctr"/>
+            <a:lstStyle/>
+            <a:p>
+              <a:pPr algn="ctr"/>
+              <a:endParaRPr kumimoji="1" lang="ja-JP" altLang="en-US" sz="2400" dirty="0"/>
+            </a:p>
+          </p:txBody>
+        </p:sp>
+        <p:sp>
+          <p:nvSpPr>
+            <p:cNvPr id="95" name="正方形/長方形 94"/>
+            <p:cNvSpPr/>
+            <p:nvPr/>
+          </p:nvSpPr>
+          <p:spPr>
+            <a:xfrm>
+              <a:off x="7842266" y="5707806"/>
+              <a:ext cx="406932" cy="461665"/>
+            </a:xfrm>
+            <a:prstGeom prst="rect">
+              <a:avLst/>
+            </a:prstGeom>
+          </p:spPr>
+          <p:txBody>
+            <a:bodyPr wrap="none">
+              <a:spAutoFit/>
+            </a:bodyPr>
+            <a:lstStyle/>
+            <a:p>
+              <a:r>
+                <a:rPr lang="en-US" altLang="ja-JP" sz="2400" b="1" dirty="0" smtClean="0">
+                  <a:solidFill>
+                    <a:srgbClr val="FF0000"/>
+                  </a:solidFill>
+                  <a:latin typeface="Arial Black"/>
+                  <a:ea typeface="ＤＦＰ勘亭流" charset="2"/>
+                  <a:cs typeface="Arial Black"/>
+                </a:rPr>
+                <a:t>T</a:t>
+              </a:r>
+              <a:endParaRPr lang="ja-JP" altLang="en-US" sz="2400" b="1" dirty="0">
                 <a:solidFill>
-                  <a:srgbClr val="00FF00"/>
+                  <a:srgbClr val="800000"/>
                 </a:solidFill>
                 <a:latin typeface="Arial Black"/>
                 <a:ea typeface="ＤＦＰ勘亭流" charset="2"/>
                 <a:cs typeface="Arial Black"/>
-              </a:rPr>
-              <a:t>A</a:t>
-            </a:r>
-            <a:endParaRPr lang="ja-JP" altLang="en-US" sz="2400" b="1" dirty="0">
-              <a:solidFill>
-                <a:srgbClr val="800000"/>
-              </a:solidFill>
-              <a:latin typeface="Arial Black"/>
-              <a:ea typeface="ＤＦＰ勘亭流" charset="2"/>
-              <a:cs typeface="Arial Black"/>
-            </a:endParaRPr>
-          </a:p>
-        </p:txBody>
-      </p:sp>
-      <p:sp>
-        <p:nvSpPr>
-          <p:cNvPr id="88" name="テキスト ボックス 87"/>
-          <p:cNvSpPr txBox="1"/>
-          <p:nvPr/>
-        </p:nvSpPr>
-        <p:spPr>
-          <a:xfrm>
-            <a:off x="8453622" y="3352246"/>
-            <a:ext cx="287158" cy="461665"/>
-          </a:xfrm>
-          <a:prstGeom prst="rect">
-            <a:avLst/>
-          </a:prstGeom>
-          <a:noFill/>
-        </p:spPr>
-        <p:txBody>
-          <a:bodyPr wrap="none" rtlCol="0">
-            <a:spAutoFit/>
-          </a:bodyPr>
-          <a:lstStyle/>
-          <a:p>
-            <a:r>
-              <a:rPr lang="en-US" altLang="ja-JP" sz="2400" dirty="0" smtClean="0">
+              </a:endParaRPr>
+            </a:p>
+          </p:txBody>
+        </p:sp>
+        <p:sp>
+          <p:nvSpPr>
+            <p:cNvPr id="96" name="テキスト ボックス 95"/>
+            <p:cNvSpPr txBox="1"/>
+            <p:nvPr/>
+          </p:nvSpPr>
+          <p:spPr>
+            <a:xfrm>
+              <a:off x="8361756" y="5707806"/>
+              <a:ext cx="287158" cy="461665"/>
+            </a:xfrm>
+            <a:prstGeom prst="rect">
+              <a:avLst/>
+            </a:prstGeom>
+            <a:noFill/>
+          </p:spPr>
+          <p:txBody>
+            <a:bodyPr wrap="none" rtlCol="0">
+              <a:spAutoFit/>
+            </a:bodyPr>
+            <a:lstStyle/>
+            <a:p>
+              <a:r>
+                <a:rPr lang="en-US" altLang="ja-JP" sz="2400" dirty="0" smtClean="0">
+                  <a:solidFill>
+                    <a:srgbClr val="FF00FF"/>
+                  </a:solidFill>
+                  <a:latin typeface="Arial Black"/>
+                  <a:cs typeface="Arial Black"/>
+                </a:rPr>
+                <a:t>-</a:t>
+              </a:r>
+              <a:endParaRPr lang="ja-JP" altLang="en-US" sz="2400" dirty="0">
                 <a:solidFill>
                   <a:srgbClr val="FF00FF"/>
                 </a:solidFill>
                 <a:latin typeface="Arial Black"/>
                 <a:cs typeface="Arial Black"/>
-              </a:rPr>
-              <a:t>-</a:t>
-            </a:r>
-            <a:endParaRPr lang="ja-JP" altLang="en-US" sz="2400" dirty="0">
-              <a:solidFill>
-                <a:srgbClr val="FF00FF"/>
-              </a:solidFill>
-              <a:latin typeface="Arial Black"/>
-              <a:cs typeface="Arial Black"/>
-            </a:endParaRPr>
-          </a:p>
-        </p:txBody>
-      </p:sp>
-      <p:sp>
-        <p:nvSpPr>
-          <p:cNvPr id="93" name="テキスト ボックス 92"/>
-          <p:cNvSpPr txBox="1"/>
-          <p:nvPr/>
-        </p:nvSpPr>
-        <p:spPr>
-          <a:xfrm>
-            <a:off x="7363018" y="6260699"/>
-            <a:ext cx="1365428" cy="461665"/>
-          </a:xfrm>
-          <a:prstGeom prst="rect">
-            <a:avLst/>
-          </a:prstGeom>
-          <a:noFill/>
-        </p:spPr>
-        <p:txBody>
-          <a:bodyPr wrap="none" rtlCol="0">
-            <a:spAutoFit/>
-          </a:bodyPr>
-          <a:lstStyle/>
-          <a:p>
-            <a:r>
-              <a:rPr lang="en-US" altLang="ja-JP" sz="2400" b="1" dirty="0" smtClean="0">
-                <a:solidFill>
-                  <a:srgbClr val="0000FF"/>
-                </a:solidFill>
-                <a:latin typeface="Arial Black"/>
-                <a:ea typeface="ＤＦＰ勘亭流" charset="2"/>
-                <a:cs typeface="Arial Black"/>
-              </a:rPr>
-              <a:t>C</a:t>
-            </a:r>
-            <a:r>
-              <a:rPr lang="en-US" altLang="ja-JP" sz="2400" b="1" dirty="0" smtClean="0">
-                <a:solidFill>
-                  <a:srgbClr val="FF0000"/>
-                </a:solidFill>
-                <a:latin typeface="Arial Black"/>
-                <a:ea typeface="ＤＦＰ勘亭流" charset="2"/>
-                <a:cs typeface="Arial Black"/>
-              </a:rPr>
-              <a:t>T</a:t>
-            </a:r>
-            <a:r>
-              <a:rPr lang="en-US" altLang="ja-JP" sz="2400" b="1" dirty="0" smtClean="0">
-                <a:solidFill>
-                  <a:srgbClr val="0000FF"/>
-                </a:solidFill>
-                <a:latin typeface="Arial Black"/>
-                <a:ea typeface="ＤＦＰ勘亭流" charset="2"/>
-                <a:cs typeface="Arial Black"/>
-              </a:rPr>
-              <a:t>C</a:t>
-            </a:r>
-            <a:r>
-              <a:rPr lang="en-US" altLang="ja-JP" sz="2400" b="1" dirty="0" smtClean="0">
-                <a:solidFill>
-                  <a:srgbClr val="00FF00"/>
-                </a:solidFill>
-                <a:latin typeface="Arial Black"/>
-                <a:ea typeface="ＤＦＰ勘亭流" charset="2"/>
-                <a:cs typeface="Arial Black"/>
-              </a:rPr>
-              <a:t>A</a:t>
-            </a:r>
-            <a:r>
-              <a:rPr lang="en-US" altLang="ja-JP" sz="2400" b="1" dirty="0" smtClean="0">
-                <a:solidFill>
-                  <a:srgbClr val="996633"/>
-                </a:solidFill>
-                <a:latin typeface="Arial Black"/>
-                <a:ea typeface="ＤＦＰ勘亭流" charset="2"/>
-                <a:cs typeface="Arial Black"/>
-              </a:rPr>
-              <a:t>G</a:t>
-            </a:r>
-            <a:endParaRPr kumimoji="1" lang="ja-JP" altLang="en-US" sz="2400" b="1" dirty="0">
-              <a:solidFill>
-                <a:srgbClr val="996633"/>
-              </a:solidFill>
-              <a:latin typeface="Arial Black"/>
-              <a:ea typeface="ＤＦＰ勘亭流" charset="2"/>
-              <a:cs typeface="Arial Black"/>
-            </a:endParaRPr>
-          </a:p>
-        </p:txBody>
-      </p:sp>
-      <p:sp>
-        <p:nvSpPr>
-          <p:cNvPr id="94" name="上矢印 93"/>
-          <p:cNvSpPr/>
-          <p:nvPr/>
-        </p:nvSpPr>
-        <p:spPr>
-          <a:xfrm>
-            <a:off x="7955732" y="6128940"/>
-            <a:ext cx="180000" cy="180000"/>
-          </a:xfrm>
-          <a:prstGeom prst="upArrow">
-            <a:avLst/>
-          </a:prstGeom>
-          <a:solidFill>
-            <a:schemeClr val="bg2">
-              <a:lumMod val="50000"/>
-            </a:schemeClr>
-          </a:solidFill>
-          <a:ln>
-            <a:solidFill>
-              <a:schemeClr val="bg2">
-                <a:lumMod val="10000"/>
-              </a:schemeClr>
-            </a:solidFill>
-          </a:ln>
-        </p:spPr>
-        <p:style>
-          <a:lnRef idx="1">
-            <a:schemeClr val="accent1"/>
-          </a:lnRef>
-          <a:fillRef idx="3">
-            <a:schemeClr val="accent1"/>
-          </a:fillRef>
-          <a:effectRef idx="2">
-            <a:schemeClr val="accent1"/>
-          </a:effectRef>
-          <a:fontRef idx="minor">
-            <a:schemeClr val="lt1"/>
-          </a:fontRef>
-        </p:style>
-        <p:txBody>
-          <a:bodyPr rtlCol="0" anchor="ctr"/>
-          <a:lstStyle/>
-          <a:p>
-            <a:pPr algn="ctr"/>
-            <a:endParaRPr kumimoji="1" lang="ja-JP" altLang="en-US" sz="2400" dirty="0"/>
-          </a:p>
-        </p:txBody>
-      </p:sp>
-      <p:sp>
-        <p:nvSpPr>
-          <p:cNvPr id="95" name="正方形/長方形 94"/>
-          <p:cNvSpPr/>
-          <p:nvPr/>
-        </p:nvSpPr>
-        <p:spPr>
-          <a:xfrm>
-            <a:off x="7842266" y="5707806"/>
-            <a:ext cx="406932" cy="461665"/>
-          </a:xfrm>
-          <a:prstGeom prst="rect">
-            <a:avLst/>
-          </a:prstGeom>
-        </p:spPr>
-        <p:txBody>
-          <a:bodyPr wrap="none">
-            <a:spAutoFit/>
-          </a:bodyPr>
-          <a:lstStyle/>
-          <a:p>
-            <a:r>
-              <a:rPr lang="en-US" altLang="ja-JP" sz="2400" b="1" dirty="0" smtClean="0">
-                <a:solidFill>
-                  <a:srgbClr val="FF0000"/>
-                </a:solidFill>
-                <a:latin typeface="Arial Black"/>
-                <a:ea typeface="ＤＦＰ勘亭流" charset="2"/>
-                <a:cs typeface="Arial Black"/>
-              </a:rPr>
-              <a:t>T</a:t>
-            </a:r>
-            <a:endParaRPr lang="ja-JP" altLang="en-US" sz="2400" b="1" dirty="0">
-              <a:solidFill>
-                <a:srgbClr val="800000"/>
-              </a:solidFill>
-              <a:latin typeface="Arial Black"/>
-              <a:ea typeface="ＤＦＰ勘亭流" charset="2"/>
-              <a:cs typeface="Arial Black"/>
-            </a:endParaRPr>
-          </a:p>
-        </p:txBody>
-      </p:sp>
-      <p:sp>
-        <p:nvSpPr>
-          <p:cNvPr id="96" name="テキスト ボックス 95"/>
-          <p:cNvSpPr txBox="1"/>
-          <p:nvPr/>
-        </p:nvSpPr>
-        <p:spPr>
-          <a:xfrm>
-            <a:off x="8363622" y="5707806"/>
-            <a:ext cx="287158" cy="461665"/>
-          </a:xfrm>
-          <a:prstGeom prst="rect">
-            <a:avLst/>
-          </a:prstGeom>
-          <a:noFill/>
-        </p:spPr>
-        <p:txBody>
-          <a:bodyPr wrap="none" rtlCol="0">
-            <a:spAutoFit/>
-          </a:bodyPr>
-          <a:lstStyle/>
-          <a:p>
-            <a:r>
-              <a:rPr lang="en-US" altLang="ja-JP" sz="2400" dirty="0" smtClean="0">
-                <a:solidFill>
-                  <a:srgbClr val="FF00FF"/>
-                </a:solidFill>
-                <a:latin typeface="Arial Black"/>
-                <a:cs typeface="Arial Black"/>
-              </a:rPr>
-              <a:t>-</a:t>
-            </a:r>
-            <a:endParaRPr lang="ja-JP" altLang="en-US" sz="2400" dirty="0">
-              <a:solidFill>
-                <a:srgbClr val="FF00FF"/>
-              </a:solidFill>
-              <a:latin typeface="Arial Black"/>
-              <a:cs typeface="Arial Black"/>
-            </a:endParaRPr>
-          </a:p>
-        </p:txBody>
-      </p:sp>
+              </a:endParaRPr>
+            </a:p>
+          </p:txBody>
+        </p:sp>
+      </p:grpSp>
       <p:sp>
         <p:nvSpPr>
           <p:cNvPr id="97" name="テキスト ボックス 96"/>

</xml_diff>